<commit_message>
Day 7 commands update
</commit_message>
<xml_diff>
--- a/Day7/DockerAndKubernetes_Training-Day7.pptx
+++ b/Day7/DockerAndKubernetes_Training-Day7.pptx
@@ -199,7 +199,7 @@
           <a:p>
             <a:fld id="{B09F413D-6E72-4B8A-80ED-A580F7C91B71}" type="datetimeFigureOut">
               <a:rPr lang="en-IN" smtClean="0"/>
-              <a:t>12-04-2023</a:t>
+              <a:t>13-04-2023</a:t>
             </a:fld>
             <a:endParaRPr lang="en-IN"/>
           </a:p>
@@ -802,7 +802,7 @@
           <a:p>
             <a:fld id="{12E8600E-B0EE-4521-BF40-4B72FBA06775}" type="datetimeFigureOut">
               <a:rPr lang="en-IN" smtClean="0"/>
-              <a:t>12-04-2023</a:t>
+              <a:t>13-04-2023</a:t>
             </a:fld>
             <a:endParaRPr lang="en-IN"/>
           </a:p>
@@ -1891,7 +1891,7 @@
             <a:fld id="{49F3E739-D457-46E5-B626-C9B182A007EE}" type="datetimeFigureOut">
               <a:rPr lang="en-US" smtClean="0"/>
               <a:pPr/>
-              <a:t>4/12/2023</a:t>
+              <a:t>4/13/2023</a:t>
             </a:fld>
             <a:endParaRPr lang="en-US"/>
           </a:p>
@@ -2873,7 +2873,7 @@
             <a:fld id="{49F3E739-D457-46E5-B626-C9B182A007EE}" type="datetimeFigureOut">
               <a:rPr lang="en-US" smtClean="0"/>
               <a:pPr/>
-              <a:t>4/12/2023</a:t>
+              <a:t>4/13/2023</a:t>
             </a:fld>
             <a:endParaRPr lang="en-US"/>
           </a:p>
@@ -4009,7 +4009,7 @@
             <a:fld id="{49F3E739-D457-46E5-B626-C9B182A007EE}" type="datetimeFigureOut">
               <a:rPr lang="en-US" smtClean="0"/>
               <a:pPr/>
-              <a:t>4/12/2023</a:t>
+              <a:t>4/13/2023</a:t>
             </a:fld>
             <a:endParaRPr lang="en-US"/>
           </a:p>
@@ -5044,7 +5044,7 @@
             <a:fld id="{49F3E739-D457-46E5-B626-C9B182A007EE}" type="datetimeFigureOut">
               <a:rPr lang="en-US" smtClean="0"/>
               <a:pPr/>
-              <a:t>4/12/2023</a:t>
+              <a:t>4/13/2023</a:t>
             </a:fld>
             <a:endParaRPr lang="en-US"/>
           </a:p>
@@ -5706,7 +5706,7 @@
             <a:fld id="{49F3E739-D457-46E5-B626-C9B182A007EE}" type="datetimeFigureOut">
               <a:rPr lang="en-US" smtClean="0"/>
               <a:pPr/>
-              <a:t>4/12/2023</a:t>
+              <a:t>4/13/2023</a:t>
             </a:fld>
             <a:endParaRPr lang="en-US"/>
           </a:p>
@@ -6569,7 +6569,7 @@
             <a:fld id="{49F3E739-D457-46E5-B626-C9B182A007EE}" type="datetimeFigureOut">
               <a:rPr lang="en-US" smtClean="0"/>
               <a:pPr/>
-              <a:t>4/12/2023</a:t>
+              <a:t>4/13/2023</a:t>
             </a:fld>
             <a:endParaRPr lang="en-US"/>
           </a:p>
@@ -6760,7 +6760,7 @@
           <a:p>
             <a:fld id="{12E8600E-B0EE-4521-BF40-4B72FBA06775}" type="datetimeFigureOut">
               <a:rPr lang="en-IN" smtClean="0"/>
-              <a:t>12-04-2023</a:t>
+              <a:t>13-04-2023</a:t>
             </a:fld>
             <a:endParaRPr lang="en-IN"/>
           </a:p>
@@ -7732,7 +7732,7 @@
           <a:p>
             <a:fld id="{12E8600E-B0EE-4521-BF40-4B72FBA06775}" type="datetimeFigureOut">
               <a:rPr lang="en-IN" smtClean="0"/>
-              <a:t>12-04-2023</a:t>
+              <a:t>13-04-2023</a:t>
             </a:fld>
             <a:endParaRPr lang="en-IN"/>
           </a:p>
@@ -7943,7 +7943,7 @@
           <a:p>
             <a:fld id="{12E8600E-B0EE-4521-BF40-4B72FBA06775}" type="datetimeFigureOut">
               <a:rPr lang="en-IN" smtClean="0"/>
-              <a:t>12-04-2023</a:t>
+              <a:t>13-04-2023</a:t>
             </a:fld>
             <a:endParaRPr lang="en-IN"/>
           </a:p>
@@ -8977,7 +8977,7 @@
           <a:p>
             <a:fld id="{12E8600E-B0EE-4521-BF40-4B72FBA06775}" type="datetimeFigureOut">
               <a:rPr lang="en-IN" smtClean="0"/>
-              <a:t>12-04-2023</a:t>
+              <a:t>13-04-2023</a:t>
             </a:fld>
             <a:endParaRPr lang="en-IN"/>
           </a:p>
@@ -9249,7 +9249,7 @@
           <a:p>
             <a:fld id="{12E8600E-B0EE-4521-BF40-4B72FBA06775}" type="datetimeFigureOut">
               <a:rPr lang="en-IN" smtClean="0"/>
-              <a:t>12-04-2023</a:t>
+              <a:t>13-04-2023</a:t>
             </a:fld>
             <a:endParaRPr lang="en-IN"/>
           </a:p>
@@ -9660,7 +9660,7 @@
             <a:fld id="{49F3E739-D457-46E5-B626-C9B182A007EE}" type="datetimeFigureOut">
               <a:rPr lang="en-US" smtClean="0"/>
               <a:pPr/>
-              <a:t>4/12/2023</a:t>
+              <a:t>4/13/2023</a:t>
             </a:fld>
             <a:endParaRPr lang="en-US"/>
           </a:p>
@@ -9788,7 +9788,7 @@
           <a:p>
             <a:fld id="{12E8600E-B0EE-4521-BF40-4B72FBA06775}" type="datetimeFigureOut">
               <a:rPr lang="en-IN" smtClean="0"/>
-              <a:t>12-04-2023</a:t>
+              <a:t>13-04-2023</a:t>
             </a:fld>
             <a:endParaRPr lang="en-IN"/>
           </a:p>
@@ -9883,7 +9883,7 @@
           <a:p>
             <a:fld id="{12E8600E-B0EE-4521-BF40-4B72FBA06775}" type="datetimeFigureOut">
               <a:rPr lang="en-IN" smtClean="0"/>
-              <a:t>12-04-2023</a:t>
+              <a:t>13-04-2023</a:t>
             </a:fld>
             <a:endParaRPr lang="en-IN"/>
           </a:p>
@@ -10964,7 +10964,7 @@
           <a:p>
             <a:fld id="{12E8600E-B0EE-4521-BF40-4B72FBA06775}" type="datetimeFigureOut">
               <a:rPr lang="en-IN" smtClean="0"/>
-              <a:t>12-04-2023</a:t>
+              <a:t>13-04-2023</a:t>
             </a:fld>
             <a:endParaRPr lang="en-IN"/>
           </a:p>
@@ -12073,7 +12073,7 @@
             <a:fld id="{49F3E739-D457-46E5-B626-C9B182A007EE}" type="datetimeFigureOut">
               <a:rPr lang="en-US" smtClean="0"/>
               <a:pPr/>
-              <a:t>4/12/2023</a:t>
+              <a:t>4/13/2023</a:t>
             </a:fld>
             <a:endParaRPr lang="en-US"/>
           </a:p>
@@ -13072,7 +13072,7 @@
             <a:fld id="{49F3E739-D457-46E5-B626-C9B182A007EE}" type="datetimeFigureOut">
               <a:rPr lang="en-US" smtClean="0"/>
               <a:pPr/>
-              <a:t>4/12/2023</a:t>
+              <a:t>4/13/2023</a:t>
             </a:fld>
             <a:endParaRPr lang="en-US"/>
           </a:p>

</xml_diff>